<commit_message>
fix(encapsulation): arrow animation waits for class to react
</commit_message>
<xml_diff>
--- a/assets/02-04-terminologie2.pptx
+++ b/assets/02-04-terminologie2.pptx
@@ -253,7 +253,7 @@
           <a:p>
             <a:fld id="{33F6309C-8E8E-4E60-A612-70E839B733E3}" type="datetimeFigureOut">
               <a:rPr lang="fr-CH" smtClean="0"/>
-              <a:t>04.09.2023</a:t>
+              <a:t>11.09.2023</a:t>
             </a:fld>
             <a:endParaRPr lang="fr-CH"/>
           </a:p>
@@ -423,7 +423,7 @@
           <a:p>
             <a:fld id="{33F6309C-8E8E-4E60-A612-70E839B733E3}" type="datetimeFigureOut">
               <a:rPr lang="fr-CH" smtClean="0"/>
-              <a:t>04.09.2023</a:t>
+              <a:t>11.09.2023</a:t>
             </a:fld>
             <a:endParaRPr lang="fr-CH"/>
           </a:p>
@@ -603,7 +603,7 @@
           <a:p>
             <a:fld id="{33F6309C-8E8E-4E60-A612-70E839B733E3}" type="datetimeFigureOut">
               <a:rPr lang="fr-CH" smtClean="0"/>
-              <a:t>04.09.2023</a:t>
+              <a:t>11.09.2023</a:t>
             </a:fld>
             <a:endParaRPr lang="fr-CH"/>
           </a:p>
@@ -773,7 +773,7 @@
           <a:p>
             <a:fld id="{33F6309C-8E8E-4E60-A612-70E839B733E3}" type="datetimeFigureOut">
               <a:rPr lang="fr-CH" smtClean="0"/>
-              <a:t>04.09.2023</a:t>
+              <a:t>11.09.2023</a:t>
             </a:fld>
             <a:endParaRPr lang="fr-CH"/>
           </a:p>
@@ -1019,7 +1019,7 @@
           <a:p>
             <a:fld id="{33F6309C-8E8E-4E60-A612-70E839B733E3}" type="datetimeFigureOut">
               <a:rPr lang="fr-CH" smtClean="0"/>
-              <a:t>04.09.2023</a:t>
+              <a:t>11.09.2023</a:t>
             </a:fld>
             <a:endParaRPr lang="fr-CH"/>
           </a:p>
@@ -1251,7 +1251,7 @@
           <a:p>
             <a:fld id="{33F6309C-8E8E-4E60-A612-70E839B733E3}" type="datetimeFigureOut">
               <a:rPr lang="fr-CH" smtClean="0"/>
-              <a:t>04.09.2023</a:t>
+              <a:t>11.09.2023</a:t>
             </a:fld>
             <a:endParaRPr lang="fr-CH"/>
           </a:p>
@@ -1618,7 +1618,7 @@
           <a:p>
             <a:fld id="{33F6309C-8E8E-4E60-A612-70E839B733E3}" type="datetimeFigureOut">
               <a:rPr lang="fr-CH" smtClean="0"/>
-              <a:t>04.09.2023</a:t>
+              <a:t>11.09.2023</a:t>
             </a:fld>
             <a:endParaRPr lang="fr-CH"/>
           </a:p>
@@ -1736,7 +1736,7 @@
           <a:p>
             <a:fld id="{33F6309C-8E8E-4E60-A612-70E839B733E3}" type="datetimeFigureOut">
               <a:rPr lang="fr-CH" smtClean="0"/>
-              <a:t>04.09.2023</a:t>
+              <a:t>11.09.2023</a:t>
             </a:fld>
             <a:endParaRPr lang="fr-CH"/>
           </a:p>
@@ -1831,7 +1831,7 @@
           <a:p>
             <a:fld id="{33F6309C-8E8E-4E60-A612-70E839B733E3}" type="datetimeFigureOut">
               <a:rPr lang="fr-CH" smtClean="0"/>
-              <a:t>04.09.2023</a:t>
+              <a:t>11.09.2023</a:t>
             </a:fld>
             <a:endParaRPr lang="fr-CH"/>
           </a:p>
@@ -2108,7 +2108,7 @@
           <a:p>
             <a:fld id="{33F6309C-8E8E-4E60-A612-70E839B733E3}" type="datetimeFigureOut">
               <a:rPr lang="fr-CH" smtClean="0"/>
-              <a:t>04.09.2023</a:t>
+              <a:t>11.09.2023</a:t>
             </a:fld>
             <a:endParaRPr lang="fr-CH"/>
           </a:p>
@@ -2365,7 +2365,7 @@
           <a:p>
             <a:fld id="{33F6309C-8E8E-4E60-A612-70E839B733E3}" type="datetimeFigureOut">
               <a:rPr lang="fr-CH" smtClean="0"/>
-              <a:t>04.09.2023</a:t>
+              <a:t>11.09.2023</a:t>
             </a:fld>
             <a:endParaRPr lang="fr-CH"/>
           </a:p>
@@ -2578,7 +2578,7 @@
           <a:p>
             <a:fld id="{33F6309C-8E8E-4E60-A612-70E839B733E3}" type="datetimeFigureOut">
               <a:rPr lang="fr-CH" smtClean="0"/>
-              <a:t>04.09.2023</a:t>
+              <a:t>11.09.2023</a:t>
             </a:fld>
             <a:endParaRPr lang="fr-CH"/>
           </a:p>
@@ -3023,11 +3023,7 @@
           <a:p>
             <a:r>
               <a:rPr lang="fr-FR" dirty="0" smtClean="0"/>
-              <a:t>Programmation Orientée </a:t>
-            </a:r>
-            <a:r>
-              <a:rPr lang="fr-FR" dirty="0" smtClean="0"/>
-              <a:t>Objet =&gt; Compléments 1</a:t>
+              <a:t>Programmation Orientée Objet =&gt; Compléments 1</a:t>
             </a:r>
             <a:endParaRPr lang="fr-CH" dirty="0"/>
           </a:p>
@@ -3347,11 +3343,7 @@
           <a:p>
             <a:r>
               <a:rPr lang="fr-FR" dirty="0" smtClean="0"/>
-              <a:t>Rappel: Réunir </a:t>
-            </a:r>
-            <a:r>
-              <a:rPr lang="fr-FR" dirty="0" smtClean="0"/>
-              <a:t>Information et Action</a:t>
+              <a:t>Rappel: Réunir Information et Action</a:t>
             </a:r>
             <a:endParaRPr lang="fr-CH" dirty="0"/>
           </a:p>
@@ -4304,11 +4296,7 @@
           <a:p>
             <a:r>
               <a:rPr lang="fr-FR" dirty="0" smtClean="0"/>
-              <a:t>Rappel : Termes </a:t>
-            </a:r>
-            <a:r>
-              <a:rPr lang="fr-FR" dirty="0" smtClean="0"/>
-              <a:t>pour décrire les éléments OO</a:t>
+              <a:t>Rappel : Termes pour décrire les éléments OO</a:t>
             </a:r>
             <a:endParaRPr lang="fr-CH" dirty="0"/>
           </a:p>
@@ -6184,6 +6172,96 @@
                       </p:childTnLst>
                     </p:cTn>
                   </p:par>
+                  <p:par>
+                    <p:cTn id="23" fill="hold">
+                      <p:stCondLst>
+                        <p:cond delay="indefinite"/>
+                      </p:stCondLst>
+                      <p:childTnLst>
+                        <p:par>
+                          <p:cTn id="24" fill="hold">
+                            <p:stCondLst>
+                              <p:cond delay="0"/>
+                            </p:stCondLst>
+                            <p:childTnLst>
+                              <p:par>
+                                <p:cTn id="25" presetID="1" presetClass="entr" presetSubtype="0" fill="hold" nodeType="clickEffect">
+                                  <p:stCondLst>
+                                    <p:cond delay="0"/>
+                                  </p:stCondLst>
+                                  <p:childTnLst>
+                                    <p:set>
+                                      <p:cBhvr>
+                                        <p:cTn id="26" dur="1" fill="hold">
+                                          <p:stCondLst>
+                                            <p:cond delay="0"/>
+                                          </p:stCondLst>
+                                        </p:cTn>
+                                        <p:tgtEl>
+                                          <p:spTgt spid="6"/>
+                                        </p:tgtEl>
+                                        <p:attrNameLst>
+                                          <p:attrName>style.visibility</p:attrName>
+                                        </p:attrNameLst>
+                                      </p:cBhvr>
+                                      <p:to>
+                                        <p:strVal val="visible"/>
+                                      </p:to>
+                                    </p:set>
+                                  </p:childTnLst>
+                                </p:cTn>
+                              </p:par>
+                            </p:childTnLst>
+                          </p:cTn>
+                        </p:par>
+                      </p:childTnLst>
+                    </p:cTn>
+                  </p:par>
+                  <p:par>
+                    <p:cTn id="27" fill="hold">
+                      <p:stCondLst>
+                        <p:cond delay="indefinite"/>
+                      </p:stCondLst>
+                      <p:childTnLst>
+                        <p:par>
+                          <p:cTn id="28" fill="hold">
+                            <p:stCondLst>
+                              <p:cond delay="0"/>
+                            </p:stCondLst>
+                            <p:childTnLst>
+                              <p:par>
+                                <p:cTn id="29" presetID="1" presetClass="entr" presetSubtype="0" fill="hold" grpId="0" nodeType="clickEffect">
+                                  <p:stCondLst>
+                                    <p:cond delay="0"/>
+                                  </p:stCondLst>
+                                  <p:childTnLst>
+                                    <p:set>
+                                      <p:cBhvr>
+                                        <p:cTn id="30" dur="1" fill="hold">
+                                          <p:stCondLst>
+                                            <p:cond delay="0"/>
+                                          </p:stCondLst>
+                                        </p:cTn>
+                                        <p:tgtEl>
+                                          <p:spTgt spid="7"/>
+                                        </p:tgtEl>
+                                        <p:attrNameLst>
+                                          <p:attrName>style.visibility</p:attrName>
+                                        </p:attrNameLst>
+                                      </p:cBhvr>
+                                      <p:to>
+                                        <p:strVal val="visible"/>
+                                      </p:to>
+                                    </p:set>
+                                  </p:childTnLst>
+                                </p:cTn>
+                              </p:par>
+                            </p:childTnLst>
+                          </p:cTn>
+                        </p:par>
+                      </p:childTnLst>
+                    </p:cTn>
+                  </p:par>
                 </p:childTnLst>
               </p:cTn>
               <p:prevCondLst>
@@ -6207,6 +6285,7 @@
     </p:tnLst>
     <p:bldLst>
       <p:bldP spid="3" grpId="0" uiExpand="1" build="p"/>
+      <p:bldP spid="7" grpId="0"/>
     </p:bldLst>
   </p:timing>
 </p:sld>
@@ -6836,6 +6915,96 @@
                       </p:childTnLst>
                     </p:cTn>
                   </p:par>
+                  <p:par>
+                    <p:cTn id="27" fill="hold">
+                      <p:stCondLst>
+                        <p:cond delay="indefinite"/>
+                      </p:stCondLst>
+                      <p:childTnLst>
+                        <p:par>
+                          <p:cTn id="28" fill="hold">
+                            <p:stCondLst>
+                              <p:cond delay="0"/>
+                            </p:stCondLst>
+                            <p:childTnLst>
+                              <p:par>
+                                <p:cTn id="29" presetID="1" presetClass="entr" presetSubtype="0" fill="hold" nodeType="clickEffect">
+                                  <p:stCondLst>
+                                    <p:cond delay="0"/>
+                                  </p:stCondLst>
+                                  <p:childTnLst>
+                                    <p:set>
+                                      <p:cBhvr>
+                                        <p:cTn id="30" dur="1" fill="hold">
+                                          <p:stCondLst>
+                                            <p:cond delay="0"/>
+                                          </p:stCondLst>
+                                        </p:cTn>
+                                        <p:tgtEl>
+                                          <p:spTgt spid="4"/>
+                                        </p:tgtEl>
+                                        <p:attrNameLst>
+                                          <p:attrName>style.visibility</p:attrName>
+                                        </p:attrNameLst>
+                                      </p:cBhvr>
+                                      <p:to>
+                                        <p:strVal val="visible"/>
+                                      </p:to>
+                                    </p:set>
+                                  </p:childTnLst>
+                                </p:cTn>
+                              </p:par>
+                            </p:childTnLst>
+                          </p:cTn>
+                        </p:par>
+                      </p:childTnLst>
+                    </p:cTn>
+                  </p:par>
+                  <p:par>
+                    <p:cTn id="31" fill="hold">
+                      <p:stCondLst>
+                        <p:cond delay="indefinite"/>
+                      </p:stCondLst>
+                      <p:childTnLst>
+                        <p:par>
+                          <p:cTn id="32" fill="hold">
+                            <p:stCondLst>
+                              <p:cond delay="0"/>
+                            </p:stCondLst>
+                            <p:childTnLst>
+                              <p:par>
+                                <p:cTn id="33" presetID="1" presetClass="entr" presetSubtype="0" fill="hold" grpId="0" nodeType="clickEffect">
+                                  <p:stCondLst>
+                                    <p:cond delay="0"/>
+                                  </p:stCondLst>
+                                  <p:childTnLst>
+                                    <p:set>
+                                      <p:cBhvr>
+                                        <p:cTn id="34" dur="1" fill="hold">
+                                          <p:stCondLst>
+                                            <p:cond delay="0"/>
+                                          </p:stCondLst>
+                                        </p:cTn>
+                                        <p:tgtEl>
+                                          <p:spTgt spid="5"/>
+                                        </p:tgtEl>
+                                        <p:attrNameLst>
+                                          <p:attrName>style.visibility</p:attrName>
+                                        </p:attrNameLst>
+                                      </p:cBhvr>
+                                      <p:to>
+                                        <p:strVal val="visible"/>
+                                      </p:to>
+                                    </p:set>
+                                  </p:childTnLst>
+                                </p:cTn>
+                              </p:par>
+                            </p:childTnLst>
+                          </p:cTn>
+                        </p:par>
+                      </p:childTnLst>
+                    </p:cTn>
+                  </p:par>
                 </p:childTnLst>
               </p:cTn>
               <p:prevCondLst>
@@ -6859,6 +7028,7 @@
     </p:tnLst>
     <p:bldLst>
       <p:bldP spid="3" grpId="0" uiExpand="1" build="p"/>
+      <p:bldP spid="5" grpId="0"/>
     </p:bldLst>
   </p:timing>
 </p:sld>
@@ -7943,6 +8113,96 @@
                       </p:childTnLst>
                     </p:cTn>
                   </p:par>
+                  <p:par>
+                    <p:cTn id="41" fill="hold">
+                      <p:stCondLst>
+                        <p:cond delay="indefinite"/>
+                      </p:stCondLst>
+                      <p:childTnLst>
+                        <p:par>
+                          <p:cTn id="42" fill="hold">
+                            <p:stCondLst>
+                              <p:cond delay="0"/>
+                            </p:stCondLst>
+                            <p:childTnLst>
+                              <p:par>
+                                <p:cTn id="43" presetID="1" presetClass="entr" presetSubtype="0" fill="hold" nodeType="clickEffect">
+                                  <p:stCondLst>
+                                    <p:cond delay="0"/>
+                                  </p:stCondLst>
+                                  <p:childTnLst>
+                                    <p:set>
+                                      <p:cBhvr>
+                                        <p:cTn id="44" dur="1" fill="hold">
+                                          <p:stCondLst>
+                                            <p:cond delay="0"/>
+                                          </p:stCondLst>
+                                        </p:cTn>
+                                        <p:tgtEl>
+                                          <p:spTgt spid="4"/>
+                                        </p:tgtEl>
+                                        <p:attrNameLst>
+                                          <p:attrName>style.visibility</p:attrName>
+                                        </p:attrNameLst>
+                                      </p:cBhvr>
+                                      <p:to>
+                                        <p:strVal val="visible"/>
+                                      </p:to>
+                                    </p:set>
+                                  </p:childTnLst>
+                                </p:cTn>
+                              </p:par>
+                            </p:childTnLst>
+                          </p:cTn>
+                        </p:par>
+                      </p:childTnLst>
+                    </p:cTn>
+                  </p:par>
+                  <p:par>
+                    <p:cTn id="45" fill="hold">
+                      <p:stCondLst>
+                        <p:cond delay="indefinite"/>
+                      </p:stCondLst>
+                      <p:childTnLst>
+                        <p:par>
+                          <p:cTn id="46" fill="hold">
+                            <p:stCondLst>
+                              <p:cond delay="0"/>
+                            </p:stCondLst>
+                            <p:childTnLst>
+                              <p:par>
+                                <p:cTn id="47" presetID="1" presetClass="entr" presetSubtype="0" fill="hold" grpId="0" nodeType="clickEffect">
+                                  <p:stCondLst>
+                                    <p:cond delay="0"/>
+                                  </p:stCondLst>
+                                  <p:childTnLst>
+                                    <p:set>
+                                      <p:cBhvr>
+                                        <p:cTn id="48" dur="1" fill="hold">
+                                          <p:stCondLst>
+                                            <p:cond delay="0"/>
+                                          </p:stCondLst>
+                                        </p:cTn>
+                                        <p:tgtEl>
+                                          <p:spTgt spid="5"/>
+                                        </p:tgtEl>
+                                        <p:attrNameLst>
+                                          <p:attrName>style.visibility</p:attrName>
+                                        </p:attrNameLst>
+                                      </p:cBhvr>
+                                      <p:to>
+                                        <p:strVal val="visible"/>
+                                      </p:to>
+                                    </p:set>
+                                  </p:childTnLst>
+                                </p:cTn>
+                              </p:par>
+                            </p:childTnLst>
+                          </p:cTn>
+                        </p:par>
+                      </p:childTnLst>
+                    </p:cTn>
+                  </p:par>
                 </p:childTnLst>
               </p:cTn>
               <p:prevCondLst>
@@ -7966,6 +8226,7 @@
     </p:tnLst>
     <p:bldLst>
       <p:bldP spid="3" grpId="0" uiExpand="1" build="p"/>
+      <p:bldP spid="5" grpId="0"/>
     </p:bldLst>
   </p:timing>
 </p:sld>
@@ -8607,6 +8868,15 @@
 </file>
 
 <file path=customXml/item1.xml><?xml version="1.0" encoding="utf-8"?>
+<?mso-contentType ?>
+<FormTemplates xmlns="http://schemas.microsoft.com/sharepoint/v3/contenttype/forms">
+  <Display>DocumentLibraryForm</Display>
+  <Edit>DocumentLibraryForm</Edit>
+  <New>DocumentLibraryForm</New>
+</FormTemplates>
+</file>
+
+<file path=customXml/item2.xml><?xml version="1.0" encoding="utf-8"?>
 <p:properties xmlns:p="http://schemas.microsoft.com/office/2006/metadata/properties" xmlns:xsi="http://www.w3.org/2001/XMLSchema-instance" xmlns:pc="http://schemas.microsoft.com/office/infopath/2007/PartnerControls">
   <documentManagement>
     <IconOverlay xmlns="http://schemas.microsoft.com/sharepoint/v4" xsi:nil="true"/>
@@ -8616,15 +8886,6 @@
     <TaxCatchAll xmlns="f7d9f5a6-831d-4621-8c77-cbcaf993e406" xsi:nil="true"/>
   </documentManagement>
 </p:properties>
-</file>
-
-<file path=customXml/item2.xml><?xml version="1.0" encoding="utf-8"?>
-<?mso-contentType ?>
-<FormTemplates xmlns="http://schemas.microsoft.com/sharepoint/v3/contenttype/forms">
-  <Display>DocumentLibraryForm</Display>
-  <Edit>DocumentLibraryForm</Edit>
-  <New>DocumentLibraryForm</New>
-</FormTemplates>
 </file>
 
 <file path=customXml/item3.xml><?xml version="1.0" encoding="utf-8"?>
@@ -8888,27 +9149,27 @@
 </file>
 
 <file path=customXml/itemProps1.xml><?xml version="1.0" encoding="utf-8"?>
-<ds:datastoreItem xmlns:ds="http://schemas.openxmlformats.org/officeDocument/2006/customXml" ds:itemID="{01E070F6-B6E4-4A85-B5F7-0336AE684D7A}">
+<ds:datastoreItem xmlns:ds="http://schemas.openxmlformats.org/officeDocument/2006/customXml" ds:itemID="{C182078B-F8DF-4D9F-86C3-CA77AFB8B093}">
   <ds:schemaRefs>
-    <ds:schemaRef ds:uri="f7d9f5a6-831d-4621-8c77-cbcaf993e406"/>
-    <ds:schemaRef ds:uri="http://purl.org/dc/elements/1.1/"/>
-    <ds:schemaRef ds:uri="http://schemas.microsoft.com/office/2006/documentManagement/types"/>
-    <ds:schemaRef ds:uri="http://schemas.microsoft.com/office/2006/metadata/properties"/>
-    <ds:schemaRef ds:uri="http://purl.org/dc/terms/"/>
-    <ds:schemaRef ds:uri="http://schemas.openxmlformats.org/package/2006/metadata/core-properties"/>
-    <ds:schemaRef ds:uri="http://purl.org/dc/dcmitype/"/>
-    <ds:schemaRef ds:uri="http://schemas.microsoft.com/office/infopath/2007/PartnerControls"/>
-    <ds:schemaRef ds:uri="http://schemas.microsoft.com/sharepoint/v4"/>
-    <ds:schemaRef ds:uri="bf2f2df3-a963-4452-b0e7-67dabc627c35"/>
-    <ds:schemaRef ds:uri="http://www.w3.org/XML/1998/namespace"/>
+    <ds:schemaRef ds:uri="http://schemas.microsoft.com/sharepoint/v3/contenttype/forms"/>
   </ds:schemaRefs>
 </ds:datastoreItem>
 </file>
 
 <file path=customXml/itemProps2.xml><?xml version="1.0" encoding="utf-8"?>
-<ds:datastoreItem xmlns:ds="http://schemas.openxmlformats.org/officeDocument/2006/customXml" ds:itemID="{C182078B-F8DF-4D9F-86C3-CA77AFB8B093}">
+<ds:datastoreItem xmlns:ds="http://schemas.openxmlformats.org/officeDocument/2006/customXml" ds:itemID="{01E070F6-B6E4-4A85-B5F7-0336AE684D7A}">
   <ds:schemaRefs>
-    <ds:schemaRef ds:uri="http://schemas.microsoft.com/sharepoint/v3/contenttype/forms"/>
+    <ds:schemaRef ds:uri="f7d9f5a6-831d-4621-8c77-cbcaf993e406"/>
+    <ds:schemaRef ds:uri="http://schemas.microsoft.com/office/2006/documentManagement/types"/>
+    <ds:schemaRef ds:uri="bf2f2df3-a963-4452-b0e7-67dabc627c35"/>
+    <ds:schemaRef ds:uri="http://schemas.microsoft.com/office/2006/metadata/properties"/>
+    <ds:schemaRef ds:uri="http://purl.org/dc/elements/1.1/"/>
+    <ds:schemaRef ds:uri="http://schemas.microsoft.com/sharepoint/v4"/>
+    <ds:schemaRef ds:uri="http://schemas.openxmlformats.org/package/2006/metadata/core-properties"/>
+    <ds:schemaRef ds:uri="http://purl.org/dc/terms/"/>
+    <ds:schemaRef ds:uri="http://schemas.microsoft.com/office/infopath/2007/PartnerControls"/>
+    <ds:schemaRef ds:uri="http://www.w3.org/XML/1998/namespace"/>
+    <ds:schemaRef ds:uri="http://purl.org/dc/dcmitype/"/>
   </ds:schemaRefs>
 </ds:datastoreItem>
 </file>

</xml_diff>